<commit_message>
Update to final report material
I discovered a bug right before submitting, but wasn’t able to fix it
in time. If you create a new class as a teacher and then register a new
student right afterwards, the new class will not be listed in the class
selection in the student registration page. I also don’t have it
restricting the teacher from creating a student if they haven’t created
a class first. All things I can easily fix before the presentation, but
wanted to let you know.
</commit_message>
<xml_diff>
--- a/Phase_IV_Complete_Software_Final_Project_042816.pptx
+++ b/Phase_IV_Complete_Software_Final_Project_042816.pptx
@@ -125,7 +125,7 @@
   </p:defaultTextStyle>
   <p:extLst>
     <p:ext uri="{EFAFB233-063F-42B5-8137-9DF3F51BA10A}">
-      <p15:sldGuideLst xmlns="" xmlns:p15="http://schemas.microsoft.com/office/powerpoint/2012/main">
+      <p15:sldGuideLst xmlns:p15="http://schemas.microsoft.com/office/powerpoint/2012/main">
         <p15:guide id="1" orient="horz" pos="2160">
           <p15:clr>
             <a:srgbClr val="A4A3A4"/>
@@ -488,7 +488,7 @@
   <p:timing>
     <p:tnLst>
       <p:par>
-        <p:cTn xmlns:p14="http://schemas.microsoft.com/office/powerpoint/2010/main" id="1" dur="indefinite" restart="never" nodeType="tmRoot"/>
+        <p:cTn id="1" dur="indefinite" restart="never" nodeType="tmRoot"/>
       </p:par>
     </p:tnLst>
   </p:timing>
@@ -682,7 +682,7 @@
   <p:timing>
     <p:tnLst>
       <p:par>
-        <p:cTn xmlns:p14="http://schemas.microsoft.com/office/powerpoint/2010/main" id="1" dur="indefinite" restart="never" nodeType="tmRoot"/>
+        <p:cTn id="1" dur="indefinite" restart="never" nodeType="tmRoot"/>
       </p:par>
     </p:tnLst>
   </p:timing>
@@ -887,7 +887,7 @@
   <p:timing>
     <p:tnLst>
       <p:par>
-        <p:cTn xmlns:p14="http://schemas.microsoft.com/office/powerpoint/2010/main" id="1" dur="indefinite" restart="never" nodeType="tmRoot"/>
+        <p:cTn id="1" dur="indefinite" restart="never" nodeType="tmRoot"/>
       </p:par>
     </p:tnLst>
   </p:timing>
@@ -1081,7 +1081,7 @@
   <p:timing>
     <p:tnLst>
       <p:par>
-        <p:cTn xmlns:p14="http://schemas.microsoft.com/office/powerpoint/2010/main" id="1" dur="indefinite" restart="never" nodeType="tmRoot"/>
+        <p:cTn id="1" dur="indefinite" restart="never" nodeType="tmRoot"/>
       </p:par>
     </p:tnLst>
   </p:timing>
@@ -1564,7 +1564,7 @@
   <p:timing>
     <p:tnLst>
       <p:par>
-        <p:cTn xmlns:p14="http://schemas.microsoft.com/office/powerpoint/2010/main" id="1" dur="indefinite" restart="never" nodeType="tmRoot"/>
+        <p:cTn id="1" dur="indefinite" restart="never" nodeType="tmRoot"/>
       </p:par>
     </p:tnLst>
   </p:timing>
@@ -1857,7 +1857,7 @@
   <p:timing>
     <p:tnLst>
       <p:par>
-        <p:cTn xmlns:p14="http://schemas.microsoft.com/office/powerpoint/2010/main" id="1" dur="indefinite" restart="never" nodeType="tmRoot"/>
+        <p:cTn id="1" dur="indefinite" restart="never" nodeType="tmRoot"/>
       </p:par>
     </p:tnLst>
   </p:timing>
@@ -2365,7 +2365,7 @@
   <p:timing>
     <p:tnLst>
       <p:par>
-        <p:cTn xmlns:p14="http://schemas.microsoft.com/office/powerpoint/2010/main" id="1" dur="indefinite" restart="never" nodeType="tmRoot"/>
+        <p:cTn id="1" dur="indefinite" restart="never" nodeType="tmRoot"/>
       </p:par>
     </p:tnLst>
   </p:timing>
@@ -2510,7 +2510,7 @@
   <p:timing>
     <p:tnLst>
       <p:par>
-        <p:cTn xmlns:p14="http://schemas.microsoft.com/office/powerpoint/2010/main" id="1" dur="indefinite" restart="never" nodeType="tmRoot"/>
+        <p:cTn id="1" dur="indefinite" restart="never" nodeType="tmRoot"/>
       </p:par>
     </p:tnLst>
   </p:timing>
@@ -2729,7 +2729,7 @@
   <p:timing>
     <p:tnLst>
       <p:par>
-        <p:cTn xmlns:p14="http://schemas.microsoft.com/office/powerpoint/2010/main" id="1" dur="indefinite" restart="never" nodeType="tmRoot"/>
+        <p:cTn id="1" dur="indefinite" restart="never" nodeType="tmRoot"/>
       </p:par>
     </p:tnLst>
   </p:timing>
@@ -3015,7 +3015,7 @@
   <p:timing>
     <p:tnLst>
       <p:par>
-        <p:cTn xmlns:p14="http://schemas.microsoft.com/office/powerpoint/2010/main" id="1" dur="indefinite" restart="never" nodeType="tmRoot"/>
+        <p:cTn id="1" dur="indefinite" restart="never" nodeType="tmRoot"/>
       </p:par>
     </p:tnLst>
   </p:timing>
@@ -3470,7 +3470,7 @@
   <p:timing>
     <p:tnLst>
       <p:par>
-        <p:cTn xmlns:p14="http://schemas.microsoft.com/office/powerpoint/2010/main" id="1" dur="indefinite" restart="never" nodeType="tmRoot"/>
+        <p:cTn id="1" dur="indefinite" restart="never" nodeType="tmRoot"/>
       </p:par>
     </p:tnLst>
   </p:timing>
@@ -4075,7 +4075,7 @@
   <p:timing>
     <p:tnLst>
       <p:par>
-        <p:cTn xmlns:p14="http://schemas.microsoft.com/office/powerpoint/2010/main" id="1" dur="indefinite" restart="never" nodeType="tmRoot"/>
+        <p:cTn id="1" dur="indefinite" restart="never" nodeType="tmRoot"/>
       </p:par>
     </p:tnLst>
   </p:timing>
@@ -4579,7 +4579,7 @@
   <p:timing>
     <p:tnLst>
       <p:par>
-        <p:cTn xmlns:p14="http://schemas.microsoft.com/office/powerpoint/2010/main" id="1" dur="indefinite" restart="never" nodeType="tmRoot"/>
+        <p:cTn id="1" dur="indefinite" restart="never" nodeType="tmRoot"/>
       </p:par>
     </p:tnLst>
   </p:timing>
@@ -4717,7 +4717,7 @@
   <p:timing>
     <p:tnLst>
       <p:par>
-        <p:cTn xmlns:p14="http://schemas.microsoft.com/office/powerpoint/2010/main" id="1" dur="indefinite" restart="never" nodeType="tmRoot"/>
+        <p:cTn id="1" dur="indefinite" restart="never" nodeType="tmRoot"/>
       </p:par>
     </p:tnLst>
   </p:timing>
@@ -4831,7 +4831,6 @@
               <a:rPr lang="en-US" b="1" dirty="0"/>
               <a:t>Relationship Class Diagram</a:t>
             </a:r>
-            <a:endParaRPr lang="en-US" b="1" dirty="0"/>
           </a:p>
         </p:txBody>
       </p:sp>
@@ -4860,7 +4859,7 @@
   <p:timing>
     <p:tnLst>
       <p:par>
-        <p:cTn xmlns:p14="http://schemas.microsoft.com/office/powerpoint/2010/main" id="1" dur="indefinite" restart="never" nodeType="tmRoot"/>
+        <p:cTn id="1" dur="indefinite" restart="never" nodeType="tmRoot"/>
       </p:par>
     </p:tnLst>
   </p:timing>
@@ -4944,7 +4943,6 @@
               <a:rPr lang="en-US" dirty="0"/>
               <a:t>Cont’d</a:t>
             </a:r>
-            <a:endParaRPr lang="en-US" dirty="0"/>
           </a:p>
         </p:txBody>
       </p:sp>
@@ -4974,7 +4972,6 @@
               <a:rPr lang="en-US" b="1" dirty="0"/>
               <a:t>Relationship Class Diagram</a:t>
             </a:r>
-            <a:endParaRPr lang="en-US" b="1" dirty="0"/>
           </a:p>
         </p:txBody>
       </p:sp>
@@ -5312,11 +5309,7 @@
             <a:pPr algn="r"/>
             <a:r>
               <a:rPr lang="en-US" dirty="0" smtClean="0"/>
-              <a:t>USER INTERFACE</a:t>
-            </a:r>
-            <a:r>
-              <a:rPr lang="en-US" dirty="0" smtClean="0"/>
-              <a:t> </a:t>
+              <a:t>USER INTERFACE </a:t>
             </a:r>
             <a:endParaRPr lang="en-US" dirty="0"/>
           </a:p>
@@ -5388,11 +5381,7 @@
             </a:r>
             <a:r>
               <a:rPr lang="en-US" sz="2000" dirty="0"/>
-              <a:t>use and be attractive to user.</a:t>
-            </a:r>
-            <a:r>
-              <a:rPr lang="en-US" sz="2000" dirty="0"/>
-              <a:t> </a:t>
+              <a:t>use and be attractive to user. </a:t>
             </a:r>
             <a:endParaRPr lang="en-US" sz="2000" dirty="0" smtClean="0"/>
           </a:p>
@@ -5406,11 +5395,7 @@
             </a:pPr>
             <a:r>
               <a:rPr lang="en-US" sz="2000" dirty="0"/>
-              <a:t>Users of the FWC without experience can learn to use the system quickly</a:t>
-            </a:r>
-            <a:r>
-              <a:rPr lang="en-US" sz="2000" dirty="0"/>
-              <a:t> </a:t>
+              <a:t>Users of the FWC without experience can learn to use the system quickly </a:t>
             </a:r>
             <a:endParaRPr lang="en-US" sz="2000" dirty="0" smtClean="0"/>
           </a:p>
@@ -5444,11 +5429,7 @@
             </a:r>
             <a:r>
               <a:rPr lang="en-US" sz="2000" dirty="0"/>
-              <a:t>wherever possible</a:t>
-            </a:r>
-            <a:r>
-              <a:rPr lang="en-US" sz="2000" dirty="0"/>
-              <a:t> </a:t>
+              <a:t>wherever possible </a:t>
             </a:r>
             <a:endParaRPr lang="en-US" sz="2000" dirty="0" smtClean="0"/>
           </a:p>
@@ -5543,7 +5524,7 @@
   <p:timing>
     <p:tnLst>
       <p:par>
-        <p:cTn xmlns:p14="http://schemas.microsoft.com/office/powerpoint/2010/main" id="1" dur="indefinite" restart="never" nodeType="tmRoot"/>
+        <p:cTn id="1" dur="indefinite" restart="never" nodeType="tmRoot"/>
       </p:par>
     </p:tnLst>
   </p:timing>
@@ -5591,15 +5572,7 @@
           <a:p>
             <a:r>
               <a:rPr lang="en-US" dirty="0" smtClean="0"/>
-              <a:t>TEACHER</a:t>
-            </a:r>
-            <a:r>
-              <a:rPr lang="en-US" dirty="0" smtClean="0"/>
-              <a:t> </a:t>
-            </a:r>
-            <a:r>
-              <a:rPr lang="en-US" dirty="0" smtClean="0"/>
-              <a:t>HOME PAGE</a:t>
+              <a:t>TEACHER HOME PAGE</a:t>
             </a:r>
             <a:endParaRPr lang="en-US" dirty="0"/>
           </a:p>
@@ -5607,8 +5580,10 @@
       </p:sp>
       <p:pic>
         <p:nvPicPr>
-          <p:cNvPr id="5" name="Picture 4"/>
-          <p:cNvPicPr/>
+          <p:cNvPr id="3" name="Picture 2"/>
+          <p:cNvPicPr>
+            <a:picLocks noChangeAspect="1"/>
+          </p:cNvPicPr>
           <p:nvPr/>
         </p:nvPicPr>
         <p:blipFill>
@@ -5619,23 +5594,18 @@
               </a:ext>
             </a:extLst>
           </a:blip>
-          <a:srcRect/>
           <a:stretch>
             <a:fillRect/>
           </a:stretch>
         </p:blipFill>
-        <p:spPr bwMode="auto">
-          <a:xfrm>
-            <a:off x="3537761" y="1378759"/>
-            <a:ext cx="5714586" cy="5123382"/>
+        <p:spPr>
+          <a:xfrm>
+            <a:off x="3296920" y="1137920"/>
+            <a:ext cx="6477000" cy="5181600"/>
           </a:xfrm>
           <a:prstGeom prst="rect">
             <a:avLst/>
           </a:prstGeom>
-          <a:noFill/>
-          <a:ln>
-            <a:noFill/>
-          </a:ln>
         </p:spPr>
       </p:pic>
     </p:spTree>
@@ -5663,7 +5633,7 @@
   <p:timing>
     <p:tnLst>
       <p:par>
-        <p:cTn xmlns:p14="http://schemas.microsoft.com/office/powerpoint/2010/main" id="1" dur="indefinite" restart="never" nodeType="tmRoot"/>
+        <p:cTn id="1" dur="indefinite" restart="never" nodeType="tmRoot"/>
       </p:par>
     </p:tnLst>
   </p:timing>
@@ -6177,7 +6147,7 @@
   <p:timing>
     <p:tnLst>
       <p:par>
-        <p:cTn xmlns:p14="http://schemas.microsoft.com/office/powerpoint/2010/main" id="1" dur="indefinite" restart="never" nodeType="tmRoot"/>
+        <p:cTn id="1" dur="indefinite" restart="never" nodeType="tmRoot"/>
       </p:par>
     </p:tnLst>
   </p:timing>
@@ -6419,7 +6389,7 @@
   <p:timing>
     <p:tnLst>
       <p:par>
-        <p:cTn xmlns:p14="http://schemas.microsoft.com/office/powerpoint/2010/main" id="1" dur="indefinite" restart="never" nodeType="tmRoot"/>
+        <p:cTn id="1" dur="indefinite" restart="never" nodeType="tmRoot"/>
       </p:par>
     </p:tnLst>
   </p:timing>
@@ -6520,7 +6490,7 @@
   <p:timing>
     <p:tnLst>
       <p:par>
-        <p:cTn xmlns:p14="http://schemas.microsoft.com/office/powerpoint/2010/main" id="1" dur="indefinite" restart="never" nodeType="tmRoot"/>
+        <p:cTn id="1" dur="indefinite" restart="never" nodeType="tmRoot"/>
       </p:par>
     </p:tnLst>
   </p:timing>
@@ -6623,7 +6593,7 @@
   <p:timing>
     <p:tnLst>
       <p:par>
-        <p:cTn xmlns:p14="http://schemas.microsoft.com/office/powerpoint/2010/main" id="1" dur="indefinite" restart="never" nodeType="tmRoot"/>
+        <p:cTn id="1" dur="indefinite" restart="never" nodeType="tmRoot"/>
       </p:par>
     </p:tnLst>
   </p:timing>
@@ -6889,7 +6859,7 @@
   <p:timing>
     <p:tnLst>
       <p:par>
-        <p:cTn xmlns:p14="http://schemas.microsoft.com/office/powerpoint/2010/main" id="1" dur="indefinite" restart="never" nodeType="tmRoot"/>
+        <p:cTn id="1" dur="indefinite" restart="never" nodeType="tmRoot"/>
       </p:par>
     </p:tnLst>
   </p:timing>
@@ -6996,7 +6966,7 @@
   <p:timing>
     <p:tnLst>
       <p:par>
-        <p:cTn xmlns:p14="http://schemas.microsoft.com/office/powerpoint/2010/main" id="1" dur="indefinite" restart="never" nodeType="tmRoot"/>
+        <p:cTn id="1" dur="indefinite" restart="never" nodeType="tmRoot"/>
       </p:par>
     </p:tnLst>
   </p:timing>
@@ -7096,12 +7066,12 @@
           <a:graphicData uri="http://schemas.openxmlformats.org/presentationml/2006/ole">
             <mc:AlternateContent xmlns:mc="http://schemas.openxmlformats.org/markup-compatibility/2006">
               <mc:Choice xmlns:v="urn:schemas-microsoft-com:vml" Requires="v">
-                <p:oleObj spid="_x0000_s2070" name="Document" r:id="rId4" imgW="6286500" imgH="5994400" progId="Word.Document.12">
+                <p:oleObj spid="_x0000_s2072" name="Document" r:id="rId5" imgW="6286500" imgH="5994400" progId="Word.Document.12">
                   <p:embed/>
                 </p:oleObj>
               </mc:Choice>
               <mc:Fallback>
-                <p:oleObj name="Document" r:id="rId4" imgW="6286500" imgH="5994400" progId="Word.Document.12">
+                <p:oleObj name="Document" r:id="rId5" imgW="6286500" imgH="5994400" progId="Word.Document.12">
                   <p:embed/>
                   <p:pic>
                     <p:nvPicPr>
@@ -7110,7 +7080,7 @@
                       <p:nvPr/>
                     </p:nvPicPr>
                     <p:blipFill>
-                      <a:blip r:embed="rId5"/>
+                      <a:blip r:embed="rId6"/>
                       <a:stretch>
                         <a:fillRect/>
                       </a:stretch>
@@ -7140,7 +7110,7 @@
           <p:nvPr/>
         </p:nvPicPr>
         <p:blipFill>
-          <a:blip r:embed="rId6"/>
+          <a:blip r:embed="rId7"/>
           <a:stretch>
             <a:fillRect/>
           </a:stretch>
@@ -7180,7 +7150,7 @@
   <p:timing>
     <p:tnLst>
       <p:par>
-        <p:cTn xmlns:p14="http://schemas.microsoft.com/office/powerpoint/2010/main" id="1" dur="indefinite" restart="never" nodeType="tmRoot"/>
+        <p:cTn id="1" dur="indefinite" restart="never" nodeType="tmRoot"/>
       </p:par>
     </p:tnLst>
   </p:timing>
@@ -7403,7 +7373,7 @@
   <p:timing>
     <p:tnLst>
       <p:par>
-        <p:cTn xmlns:p14="http://schemas.microsoft.com/office/powerpoint/2010/main" id="1" dur="indefinite" restart="never" nodeType="tmRoot"/>
+        <p:cTn id="1" dur="indefinite" restart="never" nodeType="tmRoot"/>
       </p:par>
     </p:tnLst>
   </p:timing>

</xml_diff>